<commit_message>
book's pages written and edited.
</commit_message>
<xml_diff>
--- a/Book/עץ תהליכים.pptx
+++ b/Book/עץ תהליכים.pptx
@@ -1380,7 +1380,7 @@
                 </a:schemeClr>
               </a:solidFill>
             </a:rPr>
-            <a:t>חיפוש עמדה</a:t>
+            <a:t>רישום שחקן לעמדה</a:t>
           </a:r>
           <a:endParaRPr lang="he-IL" dirty="0">
             <a:solidFill>
@@ -2040,7 +2040,7 @@
                 </a:schemeClr>
               </a:solidFill>
             </a:rPr>
-            <a:t>מחיקת טכנאי</a:t>
+            <a:t>עדכון טכנאי</a:t>
           </a:r>
           <a:endParaRPr lang="he-IL" dirty="0">
             <a:solidFill>
@@ -2121,7 +2121,7 @@
                 </a:schemeClr>
               </a:solidFill>
             </a:rPr>
-            <a:t>רישום שחקן לעמדה</a:t>
+            <a:t>חיפוש עמדה</a:t>
           </a:r>
           <a:endParaRPr lang="he-IL" dirty="0">
             <a:solidFill>
@@ -2285,7 +2285,7 @@
                 </a:schemeClr>
               </a:solidFill>
             </a:rPr>
-            <a:t>עדכון טכנאי</a:t>
+            <a:t>מחיקת טכנאי</a:t>
           </a:r>
           <a:endParaRPr lang="he-IL" dirty="0">
             <a:solidFill>
@@ -5539,7 +5539,7 @@
                 </a:schemeClr>
               </a:solidFill>
             </a:rPr>
-            <a:t>חיפוש עמדה</a:t>
+            <a:t>רישום שחקן לעמדה</a:t>
           </a:r>
           <a:endParaRPr lang="he-IL" sz="2000" kern="1200" dirty="0">
             <a:solidFill>
@@ -5705,7 +5705,7 @@
                 </a:schemeClr>
               </a:solidFill>
             </a:rPr>
-            <a:t>רישום שחקן לעמדה</a:t>
+            <a:t>חיפוש עמדה</a:t>
           </a:r>
           <a:endParaRPr lang="he-IL" sz="2000" kern="1200" dirty="0">
             <a:solidFill>
@@ -6203,7 +6203,7 @@
                 </a:schemeClr>
               </a:solidFill>
             </a:rPr>
-            <a:t>מחיקת טכנאי</a:t>
+            <a:t>עדכון טכנאי</a:t>
           </a:r>
           <a:endParaRPr lang="he-IL" sz="2000" kern="1200" dirty="0">
             <a:solidFill>
@@ -6286,7 +6286,7 @@
                 </a:schemeClr>
               </a:solidFill>
             </a:rPr>
-            <a:t>עדכון טכנאי</a:t>
+            <a:t>מחיקת טכנאי</a:t>
           </a:r>
           <a:endParaRPr lang="he-IL" sz="2000" kern="1200" dirty="0">
             <a:solidFill>
@@ -12227,7 +12227,7 @@
             <p:nvPr>
               <p:extLst>
                 <p:ext uri="{D42A27DB-BD31-4B8C-83A1-F6EECF244321}">
-                  <p14:modId xmlns:p14="http://schemas.microsoft.com/office/powerpoint/2010/main" val="877902748"/>
+                  <p14:modId xmlns:p14="http://schemas.microsoft.com/office/powerpoint/2010/main" val="1761100425"/>
                 </p:ext>
               </p:extLst>
             </p:nvPr>

</xml_diff>